<commit_message>
fix: return empty fragment instead of null in VendorBulkActions
This prevents React error #310 ("Rendered more hooks than during the
previous render") which was caused by the component returning null
after hooks were called, combined with conditional rendering in the
parent component.

Co-Authored-By: Claude Opus 4.5 <noreply@anthropic.com>
</commit_message>
<xml_diff>
--- a/scripts/DORA-Comply-Sales-Presentation.pptx
+++ b/scripts/DORA-Comply-Sales-Presentation.pptx
@@ -3318,7 +3318,7 @@
         </p:nvSpPr>
         <p:spPr>
           <a:xfrm>
-            <a:off x="1371600" y="3977640"/>
+            <a:off x="1097280" y="3977640"/>
             <a:ext cx="1828800" cy="365760"/>
           </a:xfrm>
           <a:prstGeom prst="rect">
@@ -3357,7 +3357,7 @@
         </p:nvSpPr>
         <p:spPr>
           <a:xfrm>
-            <a:off x="1371600" y="4297680"/>
+            <a:off x="1097280" y="4297680"/>
             <a:ext cx="1828800" cy="274320"/>
           </a:xfrm>
           <a:prstGeom prst="rect">
@@ -3396,7 +3396,7 @@
         </p:nvSpPr>
         <p:spPr>
           <a:xfrm>
-            <a:off x="4114800" y="3977640"/>
+            <a:off x="3931920" y="3977640"/>
             <a:ext cx="1828800" cy="365760"/>
           </a:xfrm>
           <a:prstGeom prst="rect">
@@ -3435,7 +3435,7 @@
         </p:nvSpPr>
         <p:spPr>
           <a:xfrm>
-            <a:off x="4114800" y="4297680"/>
+            <a:off x="3931920" y="4297680"/>
             <a:ext cx="1828800" cy="274320"/>
           </a:xfrm>
           <a:prstGeom prst="rect">

</xml_diff>